<commit_message>
Fix and improve the specification for "Source or destination is self"
</commit_message>
<xml_diff>
--- a/images/example_graphs/hr_schema_simplified.pptx
+++ b/images/example_graphs/hr_schema_simplified.pptx
@@ -217,7 +217,7 @@
           <a:p>
             <a:fld id="{4F9C25BA-F9B0-4418-8CA0-3A9DF1256BA5}" type="datetimeFigureOut">
               <a:rPr lang="en-US" smtClean="0"/>
-              <a:t>3/22/20</a:t>
+              <a:t>10/8/21</a:t>
             </a:fld>
             <a:endParaRPr lang="en-US"/>
           </a:p>
@@ -33862,48 +33862,33 @@
           <a:lstStyle/>
           <a:p>
             <a:r>
-              <a:rPr lang="en-US" sz="1200" dirty="0" err="1">
+              <a:rPr lang="en-US" sz="1200" dirty="0">
                 <a:solidFill>
                   <a:schemeClr val="accent1"/>
                 </a:solidFill>
               </a:rPr>
               <a:t>employee_id</a:t>
             </a:r>
-            <a:endParaRPr lang="en-US" sz="1200" dirty="0">
-              <a:solidFill>
-                <a:schemeClr val="accent1"/>
-              </a:solidFill>
-            </a:endParaRPr>
-          </a:p>
-          <a:p>
-            <a:r>
-              <a:rPr lang="en-US" sz="1200" dirty="0" err="1">
+          </a:p>
+          <a:p>
+            <a:r>
+              <a:rPr lang="en-US" sz="1200" dirty="0">
                 <a:solidFill>
                   <a:schemeClr val="tx1"/>
                 </a:solidFill>
               </a:rPr>
               <a:t>first_name</a:t>
             </a:r>
-            <a:endParaRPr lang="en-US" sz="1200" dirty="0">
-              <a:solidFill>
-                <a:schemeClr val="tx1"/>
-              </a:solidFill>
-            </a:endParaRPr>
-          </a:p>
-          <a:p>
-            <a:r>
-              <a:rPr lang="en-US" sz="1200" dirty="0" err="1">
+          </a:p>
+          <a:p>
+            <a:r>
+              <a:rPr lang="en-US" sz="1200" dirty="0">
                 <a:solidFill>
                   <a:schemeClr val="tx1"/>
                 </a:solidFill>
               </a:rPr>
               <a:t>last_name</a:t>
             </a:r>
-            <a:endParaRPr lang="en-US" sz="1200" dirty="0">
-              <a:solidFill>
-                <a:schemeClr val="tx1"/>
-              </a:solidFill>
-            </a:endParaRPr>
           </a:p>
           <a:p>
             <a:r>
@@ -33917,48 +33902,33 @@
           </a:p>
           <a:p>
             <a:r>
-              <a:rPr lang="en-US" sz="1200" dirty="0" err="1">
+              <a:rPr lang="en-US" sz="1200" dirty="0">
                 <a:solidFill>
                   <a:schemeClr val="tx1"/>
                 </a:solidFill>
               </a:rPr>
               <a:t>phone_number</a:t>
             </a:r>
-            <a:endParaRPr lang="en-US" sz="1200" dirty="0">
-              <a:solidFill>
-                <a:schemeClr val="tx1"/>
-              </a:solidFill>
-            </a:endParaRPr>
-          </a:p>
-          <a:p>
-            <a:r>
-              <a:rPr lang="en-US" sz="1200" dirty="0" err="1">
+          </a:p>
+          <a:p>
+            <a:r>
+              <a:rPr lang="en-US" sz="1200" dirty="0">
                 <a:solidFill>
                   <a:schemeClr val="tx1"/>
                 </a:solidFill>
               </a:rPr>
               <a:t>hire_date</a:t>
             </a:r>
-            <a:endParaRPr lang="en-US" sz="1200" dirty="0">
-              <a:solidFill>
-                <a:schemeClr val="tx1"/>
-              </a:solidFill>
-            </a:endParaRPr>
-          </a:p>
-          <a:p>
-            <a:r>
-              <a:rPr lang="en-US" sz="1200" dirty="0" err="1">
+          </a:p>
+          <a:p>
+            <a:r>
+              <a:rPr lang="en-US" sz="1200" dirty="0">
                 <a:solidFill>
                   <a:schemeClr val="tx1"/>
                 </a:solidFill>
               </a:rPr>
               <a:t>job_id</a:t>
             </a:r>
-            <a:endParaRPr lang="en-US" sz="1200" dirty="0">
-              <a:solidFill>
-                <a:schemeClr val="tx1"/>
-              </a:solidFill>
-            </a:endParaRPr>
           </a:p>
           <a:p>
             <a:r>
@@ -33972,48 +33942,33 @@
           </a:p>
           <a:p>
             <a:r>
-              <a:rPr lang="en-US" sz="1200" dirty="0" err="1">
+              <a:rPr lang="en-US" sz="1200" dirty="0">
                 <a:solidFill>
                   <a:schemeClr val="tx1"/>
                 </a:solidFill>
               </a:rPr>
               <a:t>commission_pct</a:t>
             </a:r>
-            <a:endParaRPr lang="en-US" sz="1200" dirty="0">
-              <a:solidFill>
-                <a:schemeClr val="tx1"/>
-              </a:solidFill>
-            </a:endParaRPr>
-          </a:p>
-          <a:p>
-            <a:r>
-              <a:rPr lang="en-US" sz="1200" dirty="0" err="1">
+          </a:p>
+          <a:p>
+            <a:r>
+              <a:rPr lang="en-US" sz="1200" dirty="0">
                 <a:solidFill>
                   <a:schemeClr val="tx1"/>
                 </a:solidFill>
               </a:rPr>
               <a:t>manager_id</a:t>
             </a:r>
-            <a:endParaRPr lang="en-US" sz="1200" dirty="0">
-              <a:solidFill>
-                <a:schemeClr val="tx1"/>
-              </a:solidFill>
-            </a:endParaRPr>
-          </a:p>
-          <a:p>
-            <a:r>
-              <a:rPr lang="en-US" sz="1200" dirty="0" err="1">
+          </a:p>
+          <a:p>
+            <a:r>
+              <a:rPr lang="en-US" sz="1200" dirty="0">
                 <a:solidFill>
                   <a:schemeClr val="tx1"/>
                 </a:solidFill>
               </a:rPr>
               <a:t>department_id</a:t>
             </a:r>
-            <a:endParaRPr lang="en-US" sz="1200" dirty="0">
-              <a:solidFill>
-                <a:schemeClr val="tx1"/>
-              </a:solidFill>
-            </a:endParaRPr>
           </a:p>
         </p:txBody>
       </p:sp>
@@ -34185,63 +34140,43 @@
           <a:lstStyle/>
           <a:p>
             <a:r>
-              <a:rPr lang="en-US" sz="1200" dirty="0" err="1">
+              <a:rPr lang="en-US" sz="1200" dirty="0">
                 <a:solidFill>
                   <a:schemeClr val="accent1"/>
                 </a:solidFill>
               </a:rPr>
               <a:t>department_id</a:t>
             </a:r>
-            <a:endParaRPr lang="en-US" sz="1200" dirty="0">
-              <a:solidFill>
-                <a:schemeClr val="accent1"/>
-              </a:solidFill>
-            </a:endParaRPr>
-          </a:p>
-          <a:p>
-            <a:r>
-              <a:rPr lang="en-US" sz="1200" dirty="0" err="1">
+          </a:p>
+          <a:p>
+            <a:r>
+              <a:rPr lang="en-US" sz="1200" dirty="0">
                 <a:solidFill>
                   <a:schemeClr val="tx1"/>
                 </a:solidFill>
               </a:rPr>
               <a:t>department_name</a:t>
             </a:r>
-            <a:endParaRPr lang="en-US" sz="1200" dirty="0">
-              <a:solidFill>
-                <a:schemeClr val="tx1"/>
-              </a:solidFill>
-            </a:endParaRPr>
-          </a:p>
-          <a:p>
-            <a:r>
-              <a:rPr lang="en-US" sz="1200" dirty="0" err="1">
+          </a:p>
+          <a:p>
+            <a:r>
+              <a:rPr lang="en-US" sz="1200" dirty="0">
                 <a:solidFill>
                   <a:schemeClr val="tx1"/>
                 </a:solidFill>
               </a:rPr>
               <a:t>manager_id</a:t>
             </a:r>
-            <a:endParaRPr lang="en-US" sz="1200" dirty="0">
-              <a:solidFill>
-                <a:schemeClr val="tx1"/>
-              </a:solidFill>
-            </a:endParaRPr>
-          </a:p>
-          <a:p>
-            <a:r>
-              <a:rPr lang="en-US" sz="1200" dirty="0" err="1">
+          </a:p>
+          <a:p>
+            <a:r>
+              <a:rPr lang="en-US" sz="1200" dirty="0">
                 <a:solidFill>
                   <a:schemeClr val="tx1"/>
                 </a:solidFill>
               </a:rPr>
               <a:t>location_id</a:t>
             </a:r>
-            <a:endParaRPr lang="en-US" sz="1200" dirty="0">
-              <a:solidFill>
-                <a:schemeClr val="tx1"/>
-              </a:solidFill>
-            </a:endParaRPr>
           </a:p>
         </p:txBody>
       </p:sp>
@@ -34301,10 +34236,10 @@
       </p:sp>
       <p:cxnSp>
         <p:nvCxnSpPr>
-          <p:cNvPr id="84" name="Straight Arrow Connector 83">
-            <a:extLst>
-              <a:ext uri="{FF2B5EF4-FFF2-40B4-BE49-F238E27FC236}">
-                <a16:creationId xmlns:a16="http://schemas.microsoft.com/office/drawing/2014/main" id="{B63CFEF5-075A-6447-BAB6-5A904ACAB572}"/>
+          <p:cNvPr id="12" name="Straight Arrow Connector 11">
+            <a:extLst>
+              <a:ext uri="{FF2B5EF4-FFF2-40B4-BE49-F238E27FC236}">
+                <a16:creationId xmlns:a16="http://schemas.microsoft.com/office/drawing/2014/main" id="{A067921A-D339-A74D-A154-5EF410328A02}"/>
               </a:ext>
             </a:extLst>
           </p:cNvPr>
@@ -34315,8 +34250,8 @@
         </p:nvCxnSpPr>
         <p:spPr>
           <a:xfrm>
-            <a:off x="5464628" y="4691500"/>
-            <a:ext cx="354504" cy="0"/>
+            <a:off x="4659666" y="3761585"/>
+            <a:ext cx="791502" cy="0"/>
           </a:xfrm>
           <a:prstGeom prst="straightConnector1">
             <a:avLst/>
@@ -34346,10 +34281,10 @@
       </p:cxnSp>
       <p:cxnSp>
         <p:nvCxnSpPr>
-          <p:cNvPr id="86" name="Straight Arrow Connector 85">
-            <a:extLst>
-              <a:ext uri="{FF2B5EF4-FFF2-40B4-BE49-F238E27FC236}">
-                <a16:creationId xmlns:a16="http://schemas.microsoft.com/office/drawing/2014/main" id="{8385F70B-ED75-7C4F-9697-DB0DC69C50D6}"/>
+          <p:cNvPr id="13" name="Straight Arrow Connector 12">
+            <a:extLst>
+              <a:ext uri="{FF2B5EF4-FFF2-40B4-BE49-F238E27FC236}">
+                <a16:creationId xmlns:a16="http://schemas.microsoft.com/office/drawing/2014/main" id="{328CD6B1-FD1C-2B4E-8B97-AEB4659957BB}"/>
               </a:ext>
             </a:extLst>
           </p:cNvPr>
@@ -34360,8 +34295,8 @@
         </p:nvCxnSpPr>
         <p:spPr>
           <a:xfrm flipV="1">
-            <a:off x="5464628" y="3373811"/>
-            <a:ext cx="0" cy="1317689"/>
+            <a:off x="5451168" y="2842921"/>
+            <a:ext cx="0" cy="918665"/>
           </a:xfrm>
           <a:prstGeom prst="straightConnector1">
             <a:avLst/>
@@ -34391,10 +34326,10 @@
       </p:cxnSp>
       <p:cxnSp>
         <p:nvCxnSpPr>
-          <p:cNvPr id="88" name="Straight Arrow Connector 87">
-            <a:extLst>
-              <a:ext uri="{FF2B5EF4-FFF2-40B4-BE49-F238E27FC236}">
-                <a16:creationId xmlns:a16="http://schemas.microsoft.com/office/drawing/2014/main" id="{027B00DF-D57C-554F-9D09-CCE2CF6E25FB}"/>
+          <p:cNvPr id="16" name="Straight Arrow Connector 15">
+            <a:extLst>
+              <a:ext uri="{FF2B5EF4-FFF2-40B4-BE49-F238E27FC236}">
+                <a16:creationId xmlns:a16="http://schemas.microsoft.com/office/drawing/2014/main" id="{317F7574-7F27-BC40-B4DF-104E2AECAE46}"/>
               </a:ext>
             </a:extLst>
           </p:cNvPr>
@@ -34404,9 +34339,9 @@
           <p:nvPr/>
         </p:nvCxnSpPr>
         <p:spPr>
-          <a:xfrm flipH="1">
-            <a:off x="4817393" y="3373811"/>
-            <a:ext cx="647235" cy="0"/>
+          <a:xfrm>
+            <a:off x="5451168" y="2842921"/>
+            <a:ext cx="375979" cy="0"/>
           </a:xfrm>
           <a:prstGeom prst="straightConnector1">
             <a:avLst/>
@@ -34416,6 +34351,140 @@
               <a:schemeClr val="accent1"/>
             </a:solidFill>
             <a:tailEnd type="triangle"/>
+          </a:ln>
+        </p:spPr>
+        <p:style>
+          <a:lnRef idx="1">
+            <a:schemeClr val="accent1"/>
+          </a:lnRef>
+          <a:fillRef idx="0">
+            <a:schemeClr val="accent1"/>
+          </a:fillRef>
+          <a:effectRef idx="0">
+            <a:schemeClr val="accent1"/>
+          </a:effectRef>
+          <a:fontRef idx="minor">
+            <a:schemeClr val="tx1"/>
+          </a:fontRef>
+        </p:style>
+      </p:cxnSp>
+      <p:cxnSp>
+        <p:nvCxnSpPr>
+          <p:cNvPr id="17" name="Straight Arrow Connector 16">
+            <a:extLst>
+              <a:ext uri="{FF2B5EF4-FFF2-40B4-BE49-F238E27FC236}">
+                <a16:creationId xmlns:a16="http://schemas.microsoft.com/office/drawing/2014/main" id="{5CC0CA78-7839-AE4F-B18E-E2DDE9FA2447}"/>
+              </a:ext>
+            </a:extLst>
+          </p:cNvPr>
+          <p:cNvCxnSpPr>
+            <a:cxnSpLocks/>
+          </p:cNvCxnSpPr>
+          <p:nvPr/>
+        </p:nvCxnSpPr>
+        <p:spPr>
+          <a:xfrm flipH="1">
+            <a:off x="6749021" y="2842921"/>
+            <a:ext cx="552376" cy="0"/>
+          </a:xfrm>
+          <a:prstGeom prst="straightConnector1">
+            <a:avLst/>
+          </a:prstGeom>
+          <a:ln w="12700">
+            <a:solidFill>
+              <a:schemeClr val="accent1"/>
+            </a:solidFill>
+            <a:tailEnd type="triangle"/>
+          </a:ln>
+        </p:spPr>
+        <p:style>
+          <a:lnRef idx="1">
+            <a:schemeClr val="accent1"/>
+          </a:lnRef>
+          <a:fillRef idx="0">
+            <a:schemeClr val="accent1"/>
+          </a:fillRef>
+          <a:effectRef idx="0">
+            <a:schemeClr val="accent1"/>
+          </a:effectRef>
+          <a:fontRef idx="minor">
+            <a:schemeClr val="tx1"/>
+          </a:fontRef>
+        </p:style>
+      </p:cxnSp>
+      <p:cxnSp>
+        <p:nvCxnSpPr>
+          <p:cNvPr id="18" name="Straight Arrow Connector 17">
+            <a:extLst>
+              <a:ext uri="{FF2B5EF4-FFF2-40B4-BE49-F238E27FC236}">
+                <a16:creationId xmlns:a16="http://schemas.microsoft.com/office/drawing/2014/main" id="{3F18B260-64B8-7842-AF67-B96D8B5191AA}"/>
+              </a:ext>
+            </a:extLst>
+          </p:cNvPr>
+          <p:cNvCxnSpPr>
+            <a:cxnSpLocks/>
+          </p:cNvCxnSpPr>
+          <p:nvPr/>
+        </p:nvCxnSpPr>
+        <p:spPr>
+          <a:xfrm>
+            <a:off x="6694714" y="4506185"/>
+            <a:ext cx="606683" cy="0"/>
+          </a:xfrm>
+          <a:prstGeom prst="straightConnector1">
+            <a:avLst/>
+          </a:prstGeom>
+          <a:ln w="12700">
+            <a:solidFill>
+              <a:schemeClr val="accent1"/>
+            </a:solidFill>
+            <a:headEnd type="none"/>
+            <a:tailEnd type="none"/>
+          </a:ln>
+        </p:spPr>
+        <p:style>
+          <a:lnRef idx="1">
+            <a:schemeClr val="accent1"/>
+          </a:lnRef>
+          <a:fillRef idx="0">
+            <a:schemeClr val="accent1"/>
+          </a:fillRef>
+          <a:effectRef idx="0">
+            <a:schemeClr val="accent1"/>
+          </a:effectRef>
+          <a:fontRef idx="minor">
+            <a:schemeClr val="tx1"/>
+          </a:fontRef>
+        </p:style>
+      </p:cxnSp>
+      <p:cxnSp>
+        <p:nvCxnSpPr>
+          <p:cNvPr id="19" name="Straight Arrow Connector 18">
+            <a:extLst>
+              <a:ext uri="{FF2B5EF4-FFF2-40B4-BE49-F238E27FC236}">
+                <a16:creationId xmlns:a16="http://schemas.microsoft.com/office/drawing/2014/main" id="{FAAC32D8-3E47-6E44-BC51-EF07F3C033E7}"/>
+              </a:ext>
+            </a:extLst>
+          </p:cNvPr>
+          <p:cNvCxnSpPr>
+            <a:cxnSpLocks/>
+          </p:cNvCxnSpPr>
+          <p:nvPr/>
+        </p:nvCxnSpPr>
+        <p:spPr>
+          <a:xfrm flipV="1">
+            <a:off x="7301397" y="2842921"/>
+            <a:ext cx="0" cy="1672567"/>
+          </a:xfrm>
+          <a:prstGeom prst="straightConnector1">
+            <a:avLst/>
+          </a:prstGeom>
+          <a:ln w="12700">
+            <a:solidFill>
+              <a:schemeClr val="accent1"/>
+            </a:solidFill>
+            <a:headEnd type="none"/>
+            <a:tailEnd type="none"/>
           </a:ln>
         </p:spPr>
         <p:style>

</xml_diff>